<commit_message>
Fix Readme + LAst changes to the EF Presentation
</commit_message>
<xml_diff>
--- a/ASP.NET CORE — EF CORE.pptx
+++ b/ASP.NET CORE — EF CORE.pptx
@@ -5,10 +5,10 @@
     <p:sldMasterId id="2147483648" r:id="rId1"/>
   </p:sldMasterIdLst>
   <p:notesMasterIdLst>
-    <p:notesMasterId r:id="rId28"/>
+    <p:notesMasterId r:id="rId29"/>
   </p:notesMasterIdLst>
   <p:handoutMasterIdLst>
-    <p:handoutMasterId r:id="rId29"/>
+    <p:handoutMasterId r:id="rId30"/>
   </p:handoutMasterIdLst>
   <p:sldIdLst>
     <p:sldId id="256" r:id="rId2"/>
@@ -37,6 +37,7 @@
     <p:sldId id="388" r:id="rId25"/>
     <p:sldId id="389" r:id="rId26"/>
     <p:sldId id="364" r:id="rId27"/>
+    <p:sldId id="390" r:id="rId28"/>
   </p:sldIdLst>
   <p:sldSz cx="9144000" cy="5143500" type="screen16x9"/>
   <p:notesSz cx="6858000" cy="9144000"/>
@@ -258,7 +259,7 @@
           <a:p>
             <a:fld id="{142DECE0-0DFF-BD44-88D2-0FF326440D26}" type="datetimeFigureOut">
               <a:rPr lang="en-US" smtClean="0"/>
-              <a:t>8/28/2017</a:t>
+              <a:t>8/30/2017</a:t>
             </a:fld>
             <a:endParaRPr lang="en-US"/>
           </a:p>
@@ -424,7 +425,7 @@
           <a:p>
             <a:fld id="{524079EE-3B77-AA4E-B586-B4DC1EA01BA6}" type="datetimeFigureOut">
               <a:rPr lang="en-US" smtClean="0"/>
-              <a:t>8/28/2017</a:t>
+              <a:t>8/30/2017</a:t>
             </a:fld>
             <a:endParaRPr lang="en-US"/>
           </a:p>
@@ -9262,11 +9263,7 @@
             </a:r>
             <a:r>
               <a:rPr lang="en-US" dirty="0" smtClean="0"/>
-              <a:t>Entities</a:t>
-            </a:r>
-            <a:r>
-              <a:rPr lang="en-US" dirty="0" smtClean="0"/>
-              <a:t>:</a:t>
+              <a:t>Entities:</a:t>
             </a:r>
           </a:p>
           <a:p>
@@ -9294,7 +9291,6 @@
               <a:rPr lang="en-US" dirty="0" smtClean="0"/>
               <a:t>;</a:t>
             </a:r>
-            <a:endParaRPr lang="en-US" dirty="0" smtClean="0"/>
           </a:p>
           <a:p>
             <a:r>
@@ -9547,11 +9543,7 @@
             </a:pPr>
             <a:r>
               <a:rPr lang="en-US" dirty="0" smtClean="0"/>
-              <a:t>No-Tracking Entities</a:t>
-            </a:r>
-            <a:r>
-              <a:rPr lang="en-US" dirty="0" smtClean="0"/>
-              <a:t>:</a:t>
+              <a:t>No-Tracking Entities:</a:t>
             </a:r>
           </a:p>
           <a:p>
@@ -9563,7 +9555,6 @@
               <a:rPr lang="en-US" dirty="0" smtClean="0"/>
               <a:t>;</a:t>
             </a:r>
-            <a:endParaRPr lang="en-US" dirty="0" smtClean="0"/>
           </a:p>
           <a:p>
             <a:r>
@@ -11518,7 +11509,6 @@
               <a:rPr lang="en-US" b="1" dirty="0" smtClean="0"/>
               <a:t>model.</a:t>
             </a:r>
-            <a:endParaRPr lang="en-US" b="1" dirty="0" smtClean="0"/>
           </a:p>
         </p:txBody>
       </p:sp>
@@ -12561,6 +12551,263 @@
     <p:extLst>
       <p:ext uri="{BB962C8B-B14F-4D97-AF65-F5344CB8AC3E}">
         <p14:creationId xmlns:p14="http://schemas.microsoft.com/office/powerpoint/2010/main" val="1841953523"/>
+      </p:ext>
+    </p:extLst>
+  </p:cSld>
+  <p:clrMapOvr>
+    <a:masterClrMapping/>
+  </p:clrMapOvr>
+  <p:timing>
+    <p:tnLst>
+      <p:par>
+        <p:cTn id="1" dur="indefinite" restart="never" nodeType="tmRoot"/>
+      </p:par>
+    </p:tnLst>
+  </p:timing>
+</p:sld>
+</file>
+
+<file path=ppt/slides/slide27.xml><?xml version="1.0" encoding="utf-8"?>
+<p:sld xmlns:a="http://schemas.openxmlformats.org/drawingml/2006/main" xmlns:r="http://schemas.openxmlformats.org/officeDocument/2006/relationships" xmlns:p="http://schemas.openxmlformats.org/presentationml/2006/main">
+  <p:cSld>
+    <p:spTree>
+      <p:nvGrpSpPr>
+        <p:cNvPr id="1" name=""/>
+        <p:cNvGrpSpPr/>
+        <p:nvPr/>
+      </p:nvGrpSpPr>
+      <p:grpSpPr>
+        <a:xfrm>
+          <a:off x="0" y="0"/>
+          <a:ext cx="0" cy="0"/>
+          <a:chOff x="0" y="0"/>
+          <a:chExt cx="0" cy="0"/>
+        </a:xfrm>
+      </p:grpSpPr>
+      <p:sp>
+        <p:nvSpPr>
+          <p:cNvPr id="2" name="Title 1"/>
+          <p:cNvSpPr>
+            <a:spLocks noGrp="1"/>
+          </p:cNvSpPr>
+          <p:nvPr>
+            <p:ph type="title"/>
+          </p:nvPr>
+        </p:nvSpPr>
+        <p:spPr>
+          <a:xfrm>
+            <a:off x="356346" y="289112"/>
+            <a:ext cx="6736977" cy="473460"/>
+          </a:xfrm>
+        </p:spPr>
+        <p:txBody>
+          <a:bodyPr>
+            <a:normAutofit/>
+          </a:bodyPr>
+          <a:lstStyle/>
+          <a:p>
+            <a:r>
+              <a:rPr lang="en-US" dirty="0" smtClean="0"/>
+              <a:t>Task</a:t>
+            </a:r>
+            <a:endParaRPr lang="en-US" dirty="0"/>
+          </a:p>
+        </p:txBody>
+      </p:sp>
+      <p:sp>
+        <p:nvSpPr>
+          <p:cNvPr id="4" name="Slide Number Placeholder 3"/>
+          <p:cNvSpPr>
+            <a:spLocks noGrp="1"/>
+          </p:cNvSpPr>
+          <p:nvPr>
+            <p:ph type="sldNum" sz="quarter" idx="10"/>
+          </p:nvPr>
+        </p:nvSpPr>
+        <p:spPr/>
+        <p:txBody>
+          <a:bodyPr/>
+          <a:lstStyle/>
+          <a:p>
+            <a:fld id="{3C7397EC-AD80-4910-B762-2A6134F046A1}" type="slidenum">
+              <a:rPr lang="en-US" smtClean="0"/>
+              <a:pPr/>
+              <a:t>27</a:t>
+            </a:fld>
+            <a:endParaRPr lang="en-US" dirty="0"/>
+          </a:p>
+        </p:txBody>
+      </p:sp>
+      <p:sp>
+        <p:nvSpPr>
+          <p:cNvPr id="10" name="AutoShape 2" descr="https://media0.giphy.com/media/WmDxBPSHdEBtS/200.webp#7-grid1"/>
+          <p:cNvSpPr>
+            <a:spLocks noChangeAspect="1" noChangeArrowheads="1"/>
+          </p:cNvSpPr>
+          <p:nvPr/>
+        </p:nvSpPr>
+        <p:spPr bwMode="auto">
+          <a:xfrm>
+            <a:off x="155575" y="-144463"/>
+            <a:ext cx="304800" cy="304801"/>
+          </a:xfrm>
+          <a:prstGeom prst="rect">
+            <a:avLst/>
+          </a:prstGeom>
+          <a:noFill/>
+          <a:extLst>
+            <a:ext uri="{909E8E84-426E-40DD-AFC4-6F175D3DCCD1}">
+              <a14:hiddenFill xmlns:a14="http://schemas.microsoft.com/office/drawing/2010/main">
+                <a:solidFill>
+                  <a:srgbClr val="FFFFFF"/>
+                </a:solidFill>
+              </a14:hiddenFill>
+            </a:ext>
+          </a:extLst>
+        </p:spPr>
+        <p:txBody>
+          <a:bodyPr vert="horz" wrap="square" lIns="91440" tIns="45720" rIns="91440" bIns="45720" numCol="1" anchor="t" anchorCtr="0" compatLnSpc="1">
+            <a:prstTxWarp prst="textNoShape">
+              <a:avLst/>
+            </a:prstTxWarp>
+          </a:bodyPr>
+          <a:lstStyle/>
+          <a:p>
+            <a:endParaRPr lang="uk-UA"/>
+          </a:p>
+        </p:txBody>
+      </p:sp>
+      <p:sp>
+        <p:nvSpPr>
+          <p:cNvPr id="13" name="Content Placeholder 2"/>
+          <p:cNvSpPr>
+            <a:spLocks noGrp="1"/>
+          </p:cNvSpPr>
+          <p:nvPr>
+            <p:ph idx="1"/>
+          </p:nvPr>
+        </p:nvSpPr>
+        <p:spPr>
+          <a:xfrm>
+            <a:off x="356347" y="878963"/>
+            <a:ext cx="6736977" cy="3966882"/>
+          </a:xfrm>
+        </p:spPr>
+        <p:txBody>
+          <a:bodyPr>
+            <a:normAutofit/>
+          </a:bodyPr>
+          <a:lstStyle/>
+          <a:p>
+            <a:r>
+              <a:rPr lang="en-US" dirty="0" smtClean="0"/>
+              <a:t>2 additional Domain models: </a:t>
+            </a:r>
+          </a:p>
+          <a:p>
+            <a:pPr lvl="1"/>
+            <a:r>
+              <a:rPr lang="en-US" dirty="0" smtClean="0"/>
+              <a:t>Product(Id, Code, Name); </a:t>
+            </a:r>
+          </a:p>
+          <a:p>
+            <a:pPr lvl="1"/>
+            <a:r>
+              <a:rPr lang="en-US" dirty="0" err="1" smtClean="0"/>
+              <a:t>OrderItem</a:t>
+            </a:r>
+            <a:r>
+              <a:rPr lang="en-US" dirty="0" smtClean="0"/>
+              <a:t>(Id, </a:t>
+            </a:r>
+            <a:r>
+              <a:rPr lang="en-US" dirty="0" err="1" smtClean="0"/>
+              <a:t>OrderId</a:t>
+            </a:r>
+            <a:r>
+              <a:rPr lang="en-US" dirty="0" smtClean="0"/>
+              <a:t>, </a:t>
+            </a:r>
+            <a:r>
+              <a:rPr lang="en-US" dirty="0" err="1" smtClean="0"/>
+              <a:t>ProductId</a:t>
+            </a:r>
+            <a:r>
+              <a:rPr lang="en-US" dirty="0" smtClean="0"/>
+              <a:t>, Count) </a:t>
+            </a:r>
+          </a:p>
+          <a:p>
+            <a:r>
+              <a:rPr lang="en-US" dirty="0" smtClean="0"/>
+              <a:t>Products are predefined in DB</a:t>
+            </a:r>
+          </a:p>
+          <a:p>
+            <a:r>
+              <a:rPr lang="en-US" dirty="0" smtClean="0"/>
+              <a:t>Additional Controller for Products with </a:t>
+            </a:r>
+            <a:r>
+              <a:rPr lang="en-US" dirty="0" err="1" smtClean="0"/>
+              <a:t>GetAll</a:t>
+            </a:r>
+            <a:r>
+              <a:rPr lang="en-US" dirty="0" smtClean="0"/>
+              <a:t> and </a:t>
+            </a:r>
+            <a:r>
+              <a:rPr lang="en-US" dirty="0" err="1" smtClean="0"/>
+              <a:t>GetById</a:t>
+            </a:r>
+            <a:endParaRPr lang="en-US" dirty="0" smtClean="0"/>
+          </a:p>
+          <a:p>
+            <a:r>
+              <a:rPr lang="en-US" dirty="0" smtClean="0"/>
+              <a:t>Change Orders from </a:t>
+            </a:r>
+            <a:r>
+              <a:rPr lang="en-US" dirty="0" err="1" smtClean="0"/>
+              <a:t>OrderDetails</a:t>
+            </a:r>
+            <a:r>
+              <a:rPr lang="en-US" dirty="0" smtClean="0"/>
+              <a:t> to </a:t>
+            </a:r>
+            <a:r>
+              <a:rPr lang="en-US" dirty="0" err="1" smtClean="0"/>
+              <a:t>ICollection</a:t>
+            </a:r>
+            <a:r>
+              <a:rPr lang="en-US" dirty="0" smtClean="0"/>
+              <a:t>&lt;</a:t>
+            </a:r>
+            <a:r>
+              <a:rPr lang="en-US" smtClean="0"/>
+              <a:t>OrderItems&gt;</a:t>
+            </a:r>
+            <a:endParaRPr lang="en-US" dirty="0" smtClean="0"/>
+          </a:p>
+          <a:p>
+            <a:pPr marL="0" indent="0">
+              <a:buNone/>
+            </a:pPr>
+            <a:endParaRPr lang="en-US" dirty="0" smtClean="0"/>
+          </a:p>
+          <a:p>
+            <a:pPr marL="0" indent="0">
+              <a:buNone/>
+            </a:pPr>
+            <a:endParaRPr lang="en-US" dirty="0"/>
+          </a:p>
+        </p:txBody>
+      </p:sp>
+    </p:spTree>
+    <p:extLst>
+      <p:ext uri="{BB962C8B-B14F-4D97-AF65-F5344CB8AC3E}">
+        <p14:creationId xmlns:p14="http://schemas.microsoft.com/office/powerpoint/2010/main" val="3804009716"/>
       </p:ext>
     </p:extLst>
   </p:cSld>

</xml_diff>